<commit_message>
processzorok ppt tartalmának bővítése
</commit_message>
<xml_diff>
--- a/Processzorok.pptx
+++ b/Processzorok.pptx
@@ -13,10 +13,11 @@
     <p:sldId id="267" r:id="rId7"/>
     <p:sldId id="268" r:id="rId8"/>
     <p:sldId id="269" r:id="rId9"/>
-    <p:sldId id="265" r:id="rId10"/>
-    <p:sldId id="261" r:id="rId11"/>
-    <p:sldId id="258" r:id="rId12"/>
-    <p:sldId id="262" r:id="rId13"/>
+    <p:sldId id="270" r:id="rId10"/>
+    <p:sldId id="265" r:id="rId11"/>
+    <p:sldId id="261" r:id="rId12"/>
+    <p:sldId id="258" r:id="rId13"/>
+    <p:sldId id="262" r:id="rId14"/>
   </p:sldIdLst>
   <p:sldSz cx="12192000" cy="6858000"/>
   <p:notesSz cx="6858000" cy="9144000"/>
@@ -256,7 +257,7 @@
           <a:p>
             <a:fld id="{3FA18FD4-B378-4D3A-AEFB-1F3E4F59479F}" type="datetimeFigureOut">
               <a:rPr lang="hu-HU" smtClean="0"/>
-              <a:t>2022. 09. 18.</a:t>
+              <a:t>2022.09.19.</a:t>
             </a:fld>
             <a:endParaRPr lang="hu-HU"/>
           </a:p>
@@ -543,7 +544,7 @@
           <a:p>
             <a:fld id="{3FA18FD4-B378-4D3A-AEFB-1F3E4F59479F}" type="datetimeFigureOut">
               <a:rPr lang="hu-HU" smtClean="0"/>
-              <a:t>2022. 09. 18.</a:t>
+              <a:t>2022.09.19.</a:t>
             </a:fld>
             <a:endParaRPr lang="hu-HU"/>
           </a:p>
@@ -735,7 +736,7 @@
           <a:p>
             <a:fld id="{3FA18FD4-B378-4D3A-AEFB-1F3E4F59479F}" type="datetimeFigureOut">
               <a:rPr lang="hu-HU" smtClean="0"/>
-              <a:t>2022. 09. 18.</a:t>
+              <a:t>2022.09.19.</a:t>
             </a:fld>
             <a:endParaRPr lang="hu-HU"/>
           </a:p>
@@ -996,7 +997,7 @@
           <a:p>
             <a:fld id="{3FA18FD4-B378-4D3A-AEFB-1F3E4F59479F}" type="datetimeFigureOut">
               <a:rPr lang="hu-HU" smtClean="0"/>
-              <a:t>2022. 09. 18.</a:t>
+              <a:t>2022.09.19.</a:t>
             </a:fld>
             <a:endParaRPr lang="hu-HU"/>
           </a:p>
@@ -1420,7 +1421,7 @@
           <a:p>
             <a:fld id="{3FA18FD4-B378-4D3A-AEFB-1F3E4F59479F}" type="datetimeFigureOut">
               <a:rPr lang="hu-HU" smtClean="0"/>
-              <a:t>2022. 09. 18.</a:t>
+              <a:t>2022.09.19.</a:t>
             </a:fld>
             <a:endParaRPr lang="hu-HU"/>
           </a:p>
@@ -1966,7 +1967,7 @@
           <a:p>
             <a:fld id="{3FA18FD4-B378-4D3A-AEFB-1F3E4F59479F}" type="datetimeFigureOut">
               <a:rPr lang="hu-HU" smtClean="0"/>
-              <a:t>2022. 09. 18.</a:t>
+              <a:t>2022.09.19.</a:t>
             </a:fld>
             <a:endParaRPr lang="hu-HU"/>
           </a:p>
@@ -2806,7 +2807,7 @@
           <a:p>
             <a:fld id="{3FA18FD4-B378-4D3A-AEFB-1F3E4F59479F}" type="datetimeFigureOut">
               <a:rPr lang="hu-HU" smtClean="0"/>
-              <a:t>2022. 09. 18.</a:t>
+              <a:t>2022.09.19.</a:t>
             </a:fld>
             <a:endParaRPr lang="hu-HU"/>
           </a:p>
@@ -2976,7 +2977,7 @@
           <a:p>
             <a:fld id="{3FA18FD4-B378-4D3A-AEFB-1F3E4F59479F}" type="datetimeFigureOut">
               <a:rPr lang="hu-HU" smtClean="0"/>
-              <a:t>2022. 09. 18.</a:t>
+              <a:t>2022.09.19.</a:t>
             </a:fld>
             <a:endParaRPr lang="hu-HU"/>
           </a:p>
@@ -3160,7 +3161,7 @@
           <a:p>
             <a:fld id="{3FA18FD4-B378-4D3A-AEFB-1F3E4F59479F}" type="datetimeFigureOut">
               <a:rPr lang="hu-HU" smtClean="0"/>
-              <a:t>2022. 09. 18.</a:t>
+              <a:t>2022.09.19.</a:t>
             </a:fld>
             <a:endParaRPr lang="hu-HU"/>
           </a:p>
@@ -3330,7 +3331,7 @@
           <a:p>
             <a:fld id="{3FA18FD4-B378-4D3A-AEFB-1F3E4F59479F}" type="datetimeFigureOut">
               <a:rPr lang="hu-HU" smtClean="0"/>
-              <a:t>2022. 09. 18.</a:t>
+              <a:t>2022.09.19.</a:t>
             </a:fld>
             <a:endParaRPr lang="hu-HU"/>
           </a:p>
@@ -3578,7 +3579,7 @@
           <a:p>
             <a:fld id="{3FA18FD4-B378-4D3A-AEFB-1F3E4F59479F}" type="datetimeFigureOut">
               <a:rPr lang="hu-HU" smtClean="0"/>
-              <a:t>2022. 09. 18.</a:t>
+              <a:t>2022.09.19.</a:t>
             </a:fld>
             <a:endParaRPr lang="hu-HU"/>
           </a:p>
@@ -3815,7 +3816,7 @@
           <a:p>
             <a:fld id="{3FA18FD4-B378-4D3A-AEFB-1F3E4F59479F}" type="datetimeFigureOut">
               <a:rPr lang="hu-HU" smtClean="0"/>
-              <a:t>2022. 09. 18.</a:t>
+              <a:t>2022.09.19.</a:t>
             </a:fld>
             <a:endParaRPr lang="hu-HU"/>
           </a:p>
@@ -4188,7 +4189,7 @@
           <a:p>
             <a:fld id="{3FA18FD4-B378-4D3A-AEFB-1F3E4F59479F}" type="datetimeFigureOut">
               <a:rPr lang="hu-HU" smtClean="0"/>
-              <a:t>2022. 09. 18.</a:t>
+              <a:t>2022.09.19.</a:t>
             </a:fld>
             <a:endParaRPr lang="hu-HU"/>
           </a:p>
@@ -4306,7 +4307,7 @@
           <a:p>
             <a:fld id="{3FA18FD4-B378-4D3A-AEFB-1F3E4F59479F}" type="datetimeFigureOut">
               <a:rPr lang="hu-HU" smtClean="0"/>
-              <a:t>2022. 09. 18.</a:t>
+              <a:t>2022.09.19.</a:t>
             </a:fld>
             <a:endParaRPr lang="hu-HU"/>
           </a:p>
@@ -4401,7 +4402,7 @@
           <a:p>
             <a:fld id="{3FA18FD4-B378-4D3A-AEFB-1F3E4F59479F}" type="datetimeFigureOut">
               <a:rPr lang="hu-HU" smtClean="0"/>
-              <a:t>2022. 09. 18.</a:t>
+              <a:t>2022.09.19.</a:t>
             </a:fld>
             <a:endParaRPr lang="hu-HU"/>
           </a:p>
@@ -4652,7 +4653,7 @@
           <a:p>
             <a:fld id="{3FA18FD4-B378-4D3A-AEFB-1F3E4F59479F}" type="datetimeFigureOut">
               <a:rPr lang="hu-HU" smtClean="0"/>
-              <a:t>2022. 09. 18.</a:t>
+              <a:t>2022.09.19.</a:t>
             </a:fld>
             <a:endParaRPr lang="hu-HU"/>
           </a:p>
@@ -4939,7 +4940,7 @@
           <a:p>
             <a:fld id="{3FA18FD4-B378-4D3A-AEFB-1F3E4F59479F}" type="datetimeFigureOut">
               <a:rPr lang="hu-HU" smtClean="0"/>
-              <a:t>2022. 09. 18.</a:t>
+              <a:t>2022.09.19.</a:t>
             </a:fld>
             <a:endParaRPr lang="hu-HU"/>
           </a:p>
@@ -5152,7 +5153,7 @@
           <a:p>
             <a:fld id="{3FA18FD4-B378-4D3A-AEFB-1F3E4F59479F}" type="datetimeFigureOut">
               <a:rPr lang="hu-HU" smtClean="0"/>
-              <a:t>2022. 09. 18.</a:t>
+              <a:t>2022.09.19.</a:t>
             </a:fld>
             <a:endParaRPr lang="hu-HU"/>
           </a:p>
@@ -5738,7 +5739,7 @@
           <a:p>
             <a:r>
               <a:rPr lang="hu-HU" dirty="0" smtClean="0"/>
-              <a:t>Mi az a Frekvencia?</a:t>
+              <a:t>Cache</a:t>
             </a:r>
             <a:endParaRPr lang="hu-HU" dirty="0"/>
           </a:p>
@@ -5756,13 +5757,13 @@
         </p:nvSpPr>
         <p:spPr>
           <a:xfrm>
-            <a:off x="913795" y="2096064"/>
-            <a:ext cx="3924905" cy="4368236"/>
+            <a:off x="913796" y="2096063"/>
+            <a:ext cx="3400510" cy="4121857"/>
           </a:xfrm>
         </p:spPr>
         <p:txBody>
           <a:bodyPr>
-            <a:normAutofit lnSpcReduction="10000"/>
+            <a:normAutofit/>
           </a:bodyPr>
           <a:lstStyle/>
           <a:p>
@@ -5771,7 +5772,7 @@
                 <a:latin typeface="Times New Roman" panose="02020603050405020304" pitchFamily="18" charset="0"/>
                 <a:cs typeface="Times New Roman" panose="02020603050405020304" pitchFamily="18" charset="0"/>
               </a:rPr>
-              <a:t>Intervallum</a:t>
+              <a:t>Memória</a:t>
             </a:r>
           </a:p>
           <a:p>
@@ -5780,7 +5781,7 @@
                 <a:latin typeface="Times New Roman" panose="02020603050405020304" pitchFamily="18" charset="0"/>
                 <a:cs typeface="Times New Roman" panose="02020603050405020304" pitchFamily="18" charset="0"/>
               </a:rPr>
-              <a:t>Két impulzus között = ciklus</a:t>
+              <a:t>Regisztereknél lassabb</a:t>
             </a:r>
           </a:p>
           <a:p>
@@ -5789,128 +5790,27 @@
                 <a:latin typeface="Times New Roman" panose="02020603050405020304" pitchFamily="18" charset="0"/>
                 <a:cs typeface="Times New Roman" panose="02020603050405020304" pitchFamily="18" charset="0"/>
               </a:rPr>
-              <a:t>(MHz</a:t>
-            </a:r>
+              <a:t>Sebesség kiegyenlítés</a:t>
+            </a:r>
+          </a:p>
+          <a:p>
             <a:r>
               <a:rPr lang="hu-HU" sz="3000" dirty="0" smtClean="0">
                 <a:latin typeface="Times New Roman" panose="02020603050405020304" pitchFamily="18" charset="0"/>
                 <a:cs typeface="Times New Roman" panose="02020603050405020304" pitchFamily="18" charset="0"/>
               </a:rPr>
-              <a:t>) (</a:t>
-            </a:r>
-            <a:r>
-              <a:rPr lang="hu-HU" sz="3000" dirty="0" err="1" smtClean="0">
-                <a:latin typeface="Times New Roman" panose="02020603050405020304" pitchFamily="18" charset="0"/>
-                <a:cs typeface="Times New Roman" panose="02020603050405020304" pitchFamily="18" charset="0"/>
-              </a:rPr>
-              <a:t>GHz</a:t>
-            </a:r>
-            <a:r>
-              <a:rPr lang="hu-HU" sz="3000" dirty="0" smtClean="0">
-                <a:latin typeface="Times New Roman" panose="02020603050405020304" pitchFamily="18" charset="0"/>
-                <a:cs typeface="Times New Roman" panose="02020603050405020304" pitchFamily="18" charset="0"/>
-              </a:rPr>
-              <a:t>)</a:t>
-            </a:r>
-          </a:p>
-          <a:p>
-            <a:endParaRPr lang="hu-HU" sz="3000" dirty="0">
-              <a:latin typeface="Times New Roman" panose="02020603050405020304" pitchFamily="18" charset="0"/>
-              <a:cs typeface="Times New Roman" panose="02020603050405020304" pitchFamily="18" charset="0"/>
-            </a:endParaRPr>
-          </a:p>
-          <a:p>
-            <a:r>
-              <a:rPr lang="hu-HU" sz="3000" dirty="0" smtClean="0">
-                <a:latin typeface="Times New Roman" panose="02020603050405020304" pitchFamily="18" charset="0"/>
-                <a:cs typeface="Times New Roman" panose="02020603050405020304" pitchFamily="18" charset="0"/>
-              </a:rPr>
-              <a:t>Teljesítményre hatása van</a:t>
-            </a:r>
-            <a:endParaRPr lang="hu-HU" sz="3000" dirty="0">
-              <a:latin typeface="Times New Roman" panose="02020603050405020304" pitchFamily="18" charset="0"/>
-              <a:cs typeface="Times New Roman" panose="02020603050405020304" pitchFamily="18" charset="0"/>
-            </a:endParaRPr>
-          </a:p>
-        </p:txBody>
-      </p:sp>
-      <p:pic>
-        <p:nvPicPr>
-          <p:cNvPr id="6146" name="Picture 2" descr="https://content.instructables.com/ORIG/FQ9/DG6W/JPX5BMJH/FQ9DG6WJPX5BMJH.png?auto=webp&amp;fit=bounds&amp;frame=1&amp;height=1024&amp;width=1024&amp;auto=webp&amp;frame=1&amp;height=300"/>
-          <p:cNvPicPr>
-            <a:picLocks noChangeAspect="1" noChangeArrowheads="1"/>
-          </p:cNvPicPr>
-          <p:nvPr/>
-        </p:nvPicPr>
-        <p:blipFill>
-          <a:blip r:embed="rId2">
-            <a:extLst>
-              <a:ext uri="{28A0092B-C50C-407E-A947-70E740481C1C}">
-                <a14:useLocalDpi xmlns:a14="http://schemas.microsoft.com/office/drawing/2010/main" val="0"/>
-              </a:ext>
-            </a:extLst>
-          </a:blip>
-          <a:srcRect/>
-          <a:stretch>
-            <a:fillRect/>
-          </a:stretch>
-        </p:blipFill>
-        <p:spPr bwMode="auto">
-          <a:xfrm>
-            <a:off x="5356225" y="1499812"/>
-            <a:ext cx="6207125" cy="4964488"/>
-          </a:xfrm>
-          <a:prstGeom prst="rect">
-            <a:avLst/>
-          </a:prstGeom>
-          <a:noFill/>
-          <a:extLst>
-            <a:ext uri="{909E8E84-426E-40DD-AFC4-6F175D3DCCD1}">
-              <a14:hiddenFill xmlns:a14="http://schemas.microsoft.com/office/drawing/2010/main">
-                <a:solidFill>
-                  <a:srgbClr val="FFFFFF"/>
-                </a:solidFill>
-              </a14:hiddenFill>
-            </a:ext>
-          </a:extLst>
-        </p:spPr>
-      </p:pic>
-      <p:sp>
-        <p:nvSpPr>
-          <p:cNvPr id="4" name="Szövegdoboz 3"/>
-          <p:cNvSpPr txBox="1"/>
-          <p:nvPr/>
-        </p:nvSpPr>
-        <p:spPr>
-          <a:xfrm>
-            <a:off x="7540624" y="6464300"/>
-            <a:ext cx="1838325" cy="261610"/>
-          </a:xfrm>
-          <a:prstGeom prst="rect">
-            <a:avLst/>
-          </a:prstGeom>
-          <a:noFill/>
-        </p:spPr>
-        <p:txBody>
-          <a:bodyPr wrap="square" rtlCol="0">
-            <a:spAutoFit/>
-          </a:bodyPr>
-          <a:lstStyle/>
-          <a:p>
-            <a:r>
-              <a:rPr lang="hu-HU" sz="1100" dirty="0">
-                <a:latin typeface="Times New Roman" panose="02020603050405020304" pitchFamily="18" charset="0"/>
-                <a:cs typeface="Times New Roman" panose="02020603050405020304" pitchFamily="18" charset="0"/>
-              </a:rPr>
-              <a:t>https://tinyurl.com/58ch8u3c</a:t>
-            </a:r>
+              <a:t>Gyorsítás</a:t>
+            </a:r>
+          </a:p>
+          <a:p>
+            <a:endParaRPr lang="hu-HU" dirty="0" smtClean="0"/>
           </a:p>
         </p:txBody>
       </p:sp>
     </p:spTree>
     <p:extLst>
       <p:ext uri="{BB962C8B-B14F-4D97-AF65-F5344CB8AC3E}">
-        <p14:creationId xmlns:p14="http://schemas.microsoft.com/office/powerpoint/2010/main" val="3839454992"/>
+        <p14:creationId xmlns:p14="http://schemas.microsoft.com/office/powerpoint/2010/main" val="865148362"/>
       </p:ext>
     </p:extLst>
   </p:cSld>
@@ -5954,6 +5854,222 @@
             <p:ph type="title"/>
           </p:nvPr>
         </p:nvSpPr>
+        <p:spPr/>
+        <p:txBody>
+          <a:bodyPr/>
+          <a:lstStyle/>
+          <a:p>
+            <a:r>
+              <a:rPr lang="hu-HU" dirty="0" smtClean="0"/>
+              <a:t>Mi az a Frekvencia?</a:t>
+            </a:r>
+            <a:endParaRPr lang="hu-HU" dirty="0"/>
+          </a:p>
+        </p:txBody>
+      </p:sp>
+      <p:sp>
+        <p:nvSpPr>
+          <p:cNvPr id="3" name="Tartalom helye 2"/>
+          <p:cNvSpPr>
+            <a:spLocks noGrp="1"/>
+          </p:cNvSpPr>
+          <p:nvPr>
+            <p:ph idx="1"/>
+          </p:nvPr>
+        </p:nvSpPr>
+        <p:spPr>
+          <a:xfrm>
+            <a:off x="913795" y="2096064"/>
+            <a:ext cx="3924905" cy="4368236"/>
+          </a:xfrm>
+        </p:spPr>
+        <p:txBody>
+          <a:bodyPr>
+            <a:normAutofit lnSpcReduction="10000"/>
+          </a:bodyPr>
+          <a:lstStyle/>
+          <a:p>
+            <a:r>
+              <a:rPr lang="hu-HU" sz="3000" dirty="0" smtClean="0">
+                <a:latin typeface="Times New Roman" panose="02020603050405020304" pitchFamily="18" charset="0"/>
+                <a:cs typeface="Times New Roman" panose="02020603050405020304" pitchFamily="18" charset="0"/>
+              </a:rPr>
+              <a:t>Intervallum</a:t>
+            </a:r>
+          </a:p>
+          <a:p>
+            <a:r>
+              <a:rPr lang="hu-HU" sz="3000" dirty="0" smtClean="0">
+                <a:latin typeface="Times New Roman" panose="02020603050405020304" pitchFamily="18" charset="0"/>
+                <a:cs typeface="Times New Roman" panose="02020603050405020304" pitchFamily="18" charset="0"/>
+              </a:rPr>
+              <a:t>Két impulzus között = ciklus</a:t>
+            </a:r>
+          </a:p>
+          <a:p>
+            <a:r>
+              <a:rPr lang="hu-HU" sz="3000" dirty="0" smtClean="0">
+                <a:latin typeface="Times New Roman" panose="02020603050405020304" pitchFamily="18" charset="0"/>
+                <a:cs typeface="Times New Roman" panose="02020603050405020304" pitchFamily="18" charset="0"/>
+              </a:rPr>
+              <a:t>(MHz) (</a:t>
+            </a:r>
+            <a:r>
+              <a:rPr lang="hu-HU" sz="3000" dirty="0" err="1" smtClean="0">
+                <a:latin typeface="Times New Roman" panose="02020603050405020304" pitchFamily="18" charset="0"/>
+                <a:cs typeface="Times New Roman" panose="02020603050405020304" pitchFamily="18" charset="0"/>
+              </a:rPr>
+              <a:t>GHz</a:t>
+            </a:r>
+            <a:r>
+              <a:rPr lang="hu-HU" sz="3000" dirty="0" smtClean="0">
+                <a:latin typeface="Times New Roman" panose="02020603050405020304" pitchFamily="18" charset="0"/>
+                <a:cs typeface="Times New Roman" panose="02020603050405020304" pitchFamily="18" charset="0"/>
+              </a:rPr>
+              <a:t>)</a:t>
+            </a:r>
+          </a:p>
+          <a:p>
+            <a:endParaRPr lang="hu-HU" sz="3000" dirty="0">
+              <a:latin typeface="Times New Roman" panose="02020603050405020304" pitchFamily="18" charset="0"/>
+              <a:cs typeface="Times New Roman" panose="02020603050405020304" pitchFamily="18" charset="0"/>
+            </a:endParaRPr>
+          </a:p>
+          <a:p>
+            <a:r>
+              <a:rPr lang="hu-HU" sz="3000" dirty="0" smtClean="0">
+                <a:latin typeface="Times New Roman" panose="02020603050405020304" pitchFamily="18" charset="0"/>
+                <a:cs typeface="Times New Roman" panose="02020603050405020304" pitchFamily="18" charset="0"/>
+              </a:rPr>
+              <a:t>Teljesítményre hatása van</a:t>
+            </a:r>
+            <a:endParaRPr lang="hu-HU" sz="3000" dirty="0">
+              <a:latin typeface="Times New Roman" panose="02020603050405020304" pitchFamily="18" charset="0"/>
+              <a:cs typeface="Times New Roman" panose="02020603050405020304" pitchFamily="18" charset="0"/>
+            </a:endParaRPr>
+          </a:p>
+        </p:txBody>
+      </p:sp>
+      <p:pic>
+        <p:nvPicPr>
+          <p:cNvPr id="6146" name="Picture 2" descr="https://content.instructables.com/ORIG/FQ9/DG6W/JPX5BMJH/FQ9DG6WJPX5BMJH.png?auto=webp&amp;fit=bounds&amp;frame=1&amp;height=1024&amp;width=1024&amp;auto=webp&amp;frame=1&amp;height=300"/>
+          <p:cNvPicPr>
+            <a:picLocks noChangeAspect="1" noChangeArrowheads="1"/>
+          </p:cNvPicPr>
+          <p:nvPr/>
+        </p:nvPicPr>
+        <p:blipFill>
+          <a:blip r:embed="rId2">
+            <a:extLst>
+              <a:ext uri="{28A0092B-C50C-407E-A947-70E740481C1C}">
+                <a14:useLocalDpi xmlns:a14="http://schemas.microsoft.com/office/drawing/2010/main" val="0"/>
+              </a:ext>
+            </a:extLst>
+          </a:blip>
+          <a:srcRect/>
+          <a:stretch>
+            <a:fillRect/>
+          </a:stretch>
+        </p:blipFill>
+        <p:spPr bwMode="auto">
+          <a:xfrm>
+            <a:off x="5356225" y="1499812"/>
+            <a:ext cx="6207125" cy="4964488"/>
+          </a:xfrm>
+          <a:prstGeom prst="rect">
+            <a:avLst/>
+          </a:prstGeom>
+          <a:noFill/>
+          <a:extLst>
+            <a:ext uri="{909E8E84-426E-40DD-AFC4-6F175D3DCCD1}">
+              <a14:hiddenFill xmlns:a14="http://schemas.microsoft.com/office/drawing/2010/main">
+                <a:solidFill>
+                  <a:srgbClr val="FFFFFF"/>
+                </a:solidFill>
+              </a14:hiddenFill>
+            </a:ext>
+          </a:extLst>
+        </p:spPr>
+      </p:pic>
+      <p:sp>
+        <p:nvSpPr>
+          <p:cNvPr id="4" name="Szövegdoboz 3"/>
+          <p:cNvSpPr txBox="1"/>
+          <p:nvPr/>
+        </p:nvSpPr>
+        <p:spPr>
+          <a:xfrm>
+            <a:off x="7540624" y="6464300"/>
+            <a:ext cx="1838325" cy="261610"/>
+          </a:xfrm>
+          <a:prstGeom prst="rect">
+            <a:avLst/>
+          </a:prstGeom>
+          <a:noFill/>
+        </p:spPr>
+        <p:txBody>
+          <a:bodyPr wrap="square" rtlCol="0">
+            <a:spAutoFit/>
+          </a:bodyPr>
+          <a:lstStyle/>
+          <a:p>
+            <a:r>
+              <a:rPr lang="hu-HU" sz="1100" dirty="0">
+                <a:latin typeface="Times New Roman" panose="02020603050405020304" pitchFamily="18" charset="0"/>
+                <a:cs typeface="Times New Roman" panose="02020603050405020304" pitchFamily="18" charset="0"/>
+              </a:rPr>
+              <a:t>https://tinyurl.com/58ch8u3c</a:t>
+            </a:r>
+          </a:p>
+        </p:txBody>
+      </p:sp>
+    </p:spTree>
+    <p:extLst>
+      <p:ext uri="{BB962C8B-B14F-4D97-AF65-F5344CB8AC3E}">
+        <p14:creationId xmlns:p14="http://schemas.microsoft.com/office/powerpoint/2010/main" val="3839454992"/>
+      </p:ext>
+    </p:extLst>
+  </p:cSld>
+  <p:clrMapOvr>
+    <a:masterClrMapping/>
+  </p:clrMapOvr>
+  <p:timing>
+    <p:tnLst>
+      <p:par>
+        <p:cTn id="1" dur="indefinite" restart="never" nodeType="tmRoot"/>
+      </p:par>
+    </p:tnLst>
+  </p:timing>
+</p:sld>
+</file>
+
+<file path=ppt/slides/slide12.xml><?xml version="1.0" encoding="utf-8"?>
+<p:sld xmlns:a="http://schemas.openxmlformats.org/drawingml/2006/main" xmlns:r="http://schemas.openxmlformats.org/officeDocument/2006/relationships" xmlns:p="http://schemas.openxmlformats.org/presentationml/2006/main">
+  <p:cSld>
+    <p:spTree>
+      <p:nvGrpSpPr>
+        <p:cNvPr id="1" name=""/>
+        <p:cNvGrpSpPr/>
+        <p:nvPr/>
+      </p:nvGrpSpPr>
+      <p:grpSpPr>
+        <a:xfrm>
+          <a:off x="0" y="0"/>
+          <a:ext cx="0" cy="0"/>
+          <a:chOff x="0" y="0"/>
+          <a:chExt cx="0" cy="0"/>
+        </a:xfrm>
+      </p:grpSpPr>
+      <p:sp>
+        <p:nvSpPr>
+          <p:cNvPr id="2" name="Cím 1"/>
+          <p:cNvSpPr>
+            <a:spLocks noGrp="1"/>
+          </p:cNvSpPr>
+          <p:nvPr>
+            <p:ph type="title"/>
+          </p:nvPr>
+        </p:nvSpPr>
         <p:spPr>
           <a:xfrm>
             <a:off x="913795" y="2565400"/>
@@ -5992,7 +6108,7 @@
 </p:sld>
 </file>
 
-<file path=ppt/slides/slide12.xml><?xml version="1.0" encoding="utf-8"?>
+<file path=ppt/slides/slide13.xml><?xml version="1.0" encoding="utf-8"?>
 <p:sld xmlns:a="http://schemas.openxmlformats.org/drawingml/2006/main" xmlns:r="http://schemas.openxmlformats.org/officeDocument/2006/relationships" xmlns:p="http://schemas.openxmlformats.org/presentationml/2006/main">
   <p:cSld>
     <p:spTree>
@@ -6762,7 +6878,7 @@
         <p:spPr>
           <a:xfrm>
             <a:off x="913795" y="2096063"/>
-            <a:ext cx="5667980" cy="4088605"/>
+            <a:ext cx="2688049" cy="4088605"/>
           </a:xfrm>
         </p:spPr>
         <p:txBody>
@@ -6809,6 +6925,79 @@
               <a:latin typeface="Times New Roman" panose="02020603050405020304" pitchFamily="18" charset="0"/>
               <a:cs typeface="Times New Roman" panose="02020603050405020304" pitchFamily="18" charset="0"/>
             </a:endParaRPr>
+          </a:p>
+        </p:txBody>
+      </p:sp>
+      <p:pic>
+        <p:nvPicPr>
+          <p:cNvPr id="1026" name="Picture 2" descr="https://media.istockphoto.com/photos/binary-code-background-picture-id1046046242"/>
+          <p:cNvPicPr>
+            <a:picLocks noChangeAspect="1" noChangeArrowheads="1"/>
+          </p:cNvPicPr>
+          <p:nvPr/>
+        </p:nvPicPr>
+        <p:blipFill>
+          <a:blip r:embed="rId2">
+            <a:extLst>
+              <a:ext uri="{28A0092B-C50C-407E-A947-70E740481C1C}">
+                <a14:useLocalDpi xmlns:a14="http://schemas.microsoft.com/office/drawing/2010/main" val="0"/>
+              </a:ext>
+            </a:extLst>
+          </a:blip>
+          <a:srcRect/>
+          <a:stretch>
+            <a:fillRect/>
+          </a:stretch>
+        </p:blipFill>
+        <p:spPr bwMode="auto">
+          <a:xfrm>
+            <a:off x="4170087" y="1578400"/>
+            <a:ext cx="7237611" cy="4827431"/>
+          </a:xfrm>
+          <a:prstGeom prst="rect">
+            <a:avLst/>
+          </a:prstGeom>
+          <a:noFill/>
+          <a:extLst>
+            <a:ext uri="{909E8E84-426E-40DD-AFC4-6F175D3DCCD1}">
+              <a14:hiddenFill xmlns:a14="http://schemas.microsoft.com/office/drawing/2010/main">
+                <a:solidFill>
+                  <a:srgbClr val="FFFFFF"/>
+                </a:solidFill>
+              </a14:hiddenFill>
+            </a:ext>
+          </a:extLst>
+        </p:spPr>
+      </p:pic>
+      <p:sp>
+        <p:nvSpPr>
+          <p:cNvPr id="4" name="Szövegdoboz 3"/>
+          <p:cNvSpPr txBox="1"/>
+          <p:nvPr/>
+        </p:nvSpPr>
+        <p:spPr>
+          <a:xfrm>
+            <a:off x="6824311" y="6405831"/>
+            <a:ext cx="1929161" cy="267629"/>
+          </a:xfrm>
+          <a:prstGeom prst="rect">
+            <a:avLst/>
+          </a:prstGeom>
+          <a:noFill/>
+        </p:spPr>
+        <p:txBody>
+          <a:bodyPr wrap="square" rtlCol="0">
+            <a:spAutoFit/>
+          </a:bodyPr>
+          <a:lstStyle/>
+          <a:p>
+            <a:r>
+              <a:rPr lang="hu-HU" sz="1100" dirty="0">
+                <a:latin typeface="Times New Roman" panose="02020603050405020304" pitchFamily="18" charset="0"/>
+                <a:cs typeface="Times New Roman" panose="02020603050405020304" pitchFamily="18" charset="0"/>
+              </a:rPr>
+              <a:t>https://tinyurl.com/k59m4zun</a:t>
+            </a:r>
           </a:p>
         </p:txBody>
       </p:sp>
@@ -7161,10 +7350,6 @@
               </a:rPr>
               <a:t>jel</a:t>
             </a:r>
-            <a:endParaRPr lang="hu-HU" sz="3000" dirty="0" smtClean="0">
-              <a:latin typeface="Times New Roman" panose="02020603050405020304" pitchFamily="18" charset="0"/>
-              <a:cs typeface="Times New Roman" panose="02020603050405020304" pitchFamily="18" charset="0"/>
-            </a:endParaRPr>
           </a:p>
           <a:p>
             <a:r>
@@ -7172,19 +7357,8 @@
                 <a:latin typeface="Times New Roman" panose="02020603050405020304" pitchFamily="18" charset="0"/>
                 <a:cs typeface="Times New Roman" panose="02020603050405020304" pitchFamily="18" charset="0"/>
               </a:rPr>
-              <a:t>ALU</a:t>
-            </a:r>
-            <a:r>
-              <a:rPr lang="hu-HU" sz="3000" dirty="0" smtClean="0">
-                <a:latin typeface="Times New Roman" panose="02020603050405020304" pitchFamily="18" charset="0"/>
-                <a:cs typeface="Times New Roman" panose="02020603050405020304" pitchFamily="18" charset="0"/>
-              </a:rPr>
-              <a:t>:</a:t>
-            </a:r>
-            <a:endParaRPr lang="hu-HU" sz="3000" dirty="0" smtClean="0">
-              <a:latin typeface="Times New Roman" panose="02020603050405020304" pitchFamily="18" charset="0"/>
-              <a:cs typeface="Times New Roman" panose="02020603050405020304" pitchFamily="18" charset="0"/>
-            </a:endParaRPr>
+              <a:t>ALU:</a:t>
+            </a:r>
           </a:p>
           <a:p>
             <a:pPr lvl="1"/>
@@ -7570,31 +7744,95 @@
           <a:p>
             <a:r>
               <a:rPr lang="hu-HU" dirty="0" smtClean="0"/>
-              <a:t>Cache</a:t>
+              <a:t>Regiszterek</a:t>
             </a:r>
             <a:endParaRPr lang="hu-HU" dirty="0"/>
           </a:p>
         </p:txBody>
       </p:sp>
-      <p:sp>
-        <p:nvSpPr>
-          <p:cNvPr id="3" name="Tartalom helye 2"/>
-          <p:cNvSpPr>
-            <a:spLocks noGrp="1"/>
-          </p:cNvSpPr>
-          <p:nvPr>
-            <p:ph idx="1"/>
-          </p:nvPr>
+      <p:pic>
+        <p:nvPicPr>
+          <p:cNvPr id="4" name="Picture 2" descr="https://www.tutorialandexample.com/wp-content/uploads/2019/10/Control-Processing-Unit-2.png"/>
+          <p:cNvPicPr>
+            <a:picLocks noChangeAspect="1" noChangeArrowheads="1"/>
+          </p:cNvPicPr>
+          <p:nvPr/>
+        </p:nvPicPr>
+        <p:blipFill>
+          <a:blip r:embed="rId2">
+            <a:extLst>
+              <a:ext uri="{BEBA8EAE-BF5A-486C-A8C5-ECC9F3942E4B}">
+                <a14:imgProps xmlns:a14="http://schemas.microsoft.com/office/drawing/2010/main">
+                  <a14:imgLayer r:embed="rId3">
+                    <a14:imgEffect>
+                      <a14:backgroundRemoval t="31000" b="86500" l="0" r="33200">
+                        <a14:foregroundMark x1="7800" y1="38000" x2="15200" y2="38250"/>
+                        <a14:foregroundMark x1="8200" y1="36500" x2="13400" y2="37750"/>
+                        <a14:foregroundMark x1="5000" y1="50250" x2="29600" y2="49250"/>
+                        <a14:foregroundMark x1="6800" y1="63750" x2="28200" y2="63250"/>
+                        <a14:foregroundMark x1="11600" y1="38750" x2="28200" y2="35750"/>
+                        <a14:foregroundMark x1="4600" y1="76750" x2="31200" y2="75250"/>
+                        <a14:foregroundMark x1="4400" y1="74000" x2="30600" y2="79250"/>
+                        <a14:foregroundMark x1="3800" y1="33500" x2="28200" y2="32500"/>
+                        <a14:foregroundMark x1="5600" y1="66750" x2="28000" y2="59250"/>
+                        <a14:foregroundMark x1="6600" y1="54250" x2="26000" y2="46500"/>
+                        <a14:backgroundMark x1="34200" y1="66250" x2="34000" y2="62750"/>
+                        <a14:backgroundMark x1="34400" y1="39500" x2="34000" y2="35250"/>
+                        <a14:backgroundMark x1="33800" y1="79500" x2="34200" y2="74250"/>
+                      </a14:backgroundRemoval>
+                    </a14:imgEffect>
+                  </a14:imgLayer>
+                </a14:imgProps>
+              </a:ext>
+              <a:ext uri="{28A0092B-C50C-407E-A947-70E740481C1C}">
+                <a14:useLocalDpi xmlns:a14="http://schemas.microsoft.com/office/drawing/2010/main" val="0"/>
+              </a:ext>
+            </a:extLst>
+          </a:blip>
+          <a:srcRect/>
+          <a:stretch>
+            <a:fillRect/>
+          </a:stretch>
+        </p:blipFill>
+        <p:spPr bwMode="auto">
+          <a:xfrm>
+            <a:off x="367067" y="-199248"/>
+            <a:ext cx="9135861" cy="7308690"/>
+          </a:xfrm>
+          <a:prstGeom prst="rect">
+            <a:avLst/>
+          </a:prstGeom>
+          <a:noFill/>
+          <a:extLst>
+            <a:ext uri="{909E8E84-426E-40DD-AFC4-6F175D3DCCD1}">
+              <a14:hiddenFill xmlns:a14="http://schemas.microsoft.com/office/drawing/2010/main">
+                <a:solidFill>
+                  <a:srgbClr val="FFFFFF"/>
+                </a:solidFill>
+              </a14:hiddenFill>
+            </a:ext>
+          </a:extLst>
+        </p:spPr>
+      </p:pic>
+      <p:sp>
+        <p:nvSpPr>
+          <p:cNvPr id="5" name="Szövegdoboz 4"/>
+          <p:cNvSpPr txBox="1"/>
+          <p:nvPr/>
         </p:nvSpPr>
         <p:spPr>
           <a:xfrm>
-            <a:off x="913796" y="2096063"/>
-            <a:ext cx="3400510" cy="4121857"/>
-          </a:xfrm>
-        </p:spPr>
-        <p:txBody>
-          <a:bodyPr>
-            <a:normAutofit/>
+            <a:off x="3347381" y="2225700"/>
+            <a:ext cx="6155547" cy="553998"/>
+          </a:xfrm>
+          <a:prstGeom prst="rect">
+            <a:avLst/>
+          </a:prstGeom>
+          <a:noFill/>
+        </p:spPr>
+        <p:txBody>
+          <a:bodyPr wrap="square" rtlCol="0">
+            <a:spAutoFit/>
           </a:bodyPr>
           <a:lstStyle/>
           <a:p>
@@ -7603,45 +7841,134 @@
                 <a:latin typeface="Times New Roman" panose="02020603050405020304" pitchFamily="18" charset="0"/>
                 <a:cs typeface="Times New Roman" panose="02020603050405020304" pitchFamily="18" charset="0"/>
               </a:rPr>
-              <a:t>Memória</a:t>
-            </a:r>
-          </a:p>
-          <a:p>
+              <a:t>Célpont, végrehajt, megfelelő pillanat</a:t>
+            </a:r>
+            <a:endParaRPr lang="hu-HU" sz="3000" dirty="0">
+              <a:latin typeface="Times New Roman" panose="02020603050405020304" pitchFamily="18" charset="0"/>
+              <a:cs typeface="Times New Roman" panose="02020603050405020304" pitchFamily="18" charset="0"/>
+            </a:endParaRPr>
+          </a:p>
+        </p:txBody>
+      </p:sp>
+      <p:sp>
+        <p:nvSpPr>
+          <p:cNvPr id="6" name="Szövegdoboz 5"/>
+          <p:cNvSpPr txBox="1"/>
+          <p:nvPr/>
+        </p:nvSpPr>
+        <p:spPr>
+          <a:xfrm>
+            <a:off x="3347381" y="3179651"/>
+            <a:ext cx="6155547" cy="553998"/>
+          </a:xfrm>
+          <a:prstGeom prst="rect">
+            <a:avLst/>
+          </a:prstGeom>
+          <a:noFill/>
+        </p:spPr>
+        <p:txBody>
+          <a:bodyPr wrap="square" rtlCol="0">
+            <a:spAutoFit/>
+          </a:bodyPr>
+          <a:lstStyle/>
+          <a:p>
+            <a:r>
+              <a:rPr lang="hu-HU" sz="3000" dirty="0">
+                <a:latin typeface="Times New Roman" panose="02020603050405020304" pitchFamily="18" charset="0"/>
+                <a:cs typeface="Times New Roman" panose="02020603050405020304" pitchFamily="18" charset="0"/>
+              </a:rPr>
+              <a:t>Utasítás, </a:t>
+            </a:r>
             <a:r>
               <a:rPr lang="hu-HU" sz="3000" dirty="0" smtClean="0">
                 <a:latin typeface="Times New Roman" panose="02020603050405020304" pitchFamily="18" charset="0"/>
                 <a:cs typeface="Times New Roman" panose="02020603050405020304" pitchFamily="18" charset="0"/>
               </a:rPr>
-              <a:t>Regisztereknél lassabb</a:t>
-            </a:r>
-          </a:p>
+              <a:t>dekódolás</a:t>
+            </a:r>
+            <a:endParaRPr lang="hu-HU" sz="3000" dirty="0">
+              <a:latin typeface="Times New Roman" panose="02020603050405020304" pitchFamily="18" charset="0"/>
+              <a:cs typeface="Times New Roman" panose="02020603050405020304" pitchFamily="18" charset="0"/>
+            </a:endParaRPr>
+          </a:p>
+        </p:txBody>
+      </p:sp>
+      <p:sp>
+        <p:nvSpPr>
+          <p:cNvPr id="7" name="Szövegdoboz 6"/>
+          <p:cNvSpPr txBox="1"/>
+          <p:nvPr/>
+        </p:nvSpPr>
+        <p:spPr>
+          <a:xfrm>
+            <a:off x="3347380" y="4133602"/>
+            <a:ext cx="8461761" cy="553998"/>
+          </a:xfrm>
+          <a:prstGeom prst="rect">
+            <a:avLst/>
+          </a:prstGeom>
+          <a:noFill/>
+        </p:spPr>
+        <p:txBody>
+          <a:bodyPr wrap="square" rtlCol="0">
+            <a:spAutoFit/>
+          </a:bodyPr>
+          <a:lstStyle/>
           <a:p>
             <a:r>
               <a:rPr lang="hu-HU" sz="3000" dirty="0" smtClean="0">
                 <a:latin typeface="Times New Roman" panose="02020603050405020304" pitchFamily="18" charset="0"/>
                 <a:cs typeface="Times New Roman" panose="02020603050405020304" pitchFamily="18" charset="0"/>
               </a:rPr>
-              <a:t>Sebesség kiegyenlítés</a:t>
-            </a:r>
-          </a:p>
+              <a:t>Memória cím tárolás, CPU-hoz küldi, tárolásra küldi</a:t>
+            </a:r>
+            <a:endParaRPr lang="hu-HU" sz="3000" dirty="0">
+              <a:latin typeface="Times New Roman" panose="02020603050405020304" pitchFamily="18" charset="0"/>
+              <a:cs typeface="Times New Roman" panose="02020603050405020304" pitchFamily="18" charset="0"/>
+            </a:endParaRPr>
+          </a:p>
+        </p:txBody>
+      </p:sp>
+      <p:sp>
+        <p:nvSpPr>
+          <p:cNvPr id="8" name="Szövegdoboz 7"/>
+          <p:cNvSpPr txBox="1"/>
+          <p:nvPr/>
+        </p:nvSpPr>
+        <p:spPr>
+          <a:xfrm>
+            <a:off x="3329683" y="5087553"/>
+            <a:ext cx="7326351" cy="553998"/>
+          </a:xfrm>
+          <a:prstGeom prst="rect">
+            <a:avLst/>
+          </a:prstGeom>
+          <a:noFill/>
+        </p:spPr>
+        <p:txBody>
+          <a:bodyPr wrap="square" rtlCol="0">
+            <a:spAutoFit/>
+          </a:bodyPr>
+          <a:lstStyle/>
           <a:p>
             <a:r>
               <a:rPr lang="hu-HU" sz="3000" dirty="0" smtClean="0">
                 <a:latin typeface="Times New Roman" panose="02020603050405020304" pitchFamily="18" charset="0"/>
                 <a:cs typeface="Times New Roman" panose="02020603050405020304" pitchFamily="18" charset="0"/>
               </a:rPr>
-              <a:t>Gyorsítás</a:t>
-            </a:r>
-          </a:p>
-          <a:p>
-            <a:endParaRPr lang="hu-HU" dirty="0" smtClean="0"/>
+              <a:t>Rövid távú, matematikai és logikai adattároló</a:t>
+            </a:r>
+            <a:endParaRPr lang="hu-HU" sz="3000" dirty="0">
+              <a:latin typeface="Times New Roman" panose="02020603050405020304" pitchFamily="18" charset="0"/>
+              <a:cs typeface="Times New Roman" panose="02020603050405020304" pitchFamily="18" charset="0"/>
+            </a:endParaRPr>
           </a:p>
         </p:txBody>
       </p:sp>
     </p:spTree>
     <p:extLst>
       <p:ext uri="{BB962C8B-B14F-4D97-AF65-F5344CB8AC3E}">
-        <p14:creationId xmlns:p14="http://schemas.microsoft.com/office/powerpoint/2010/main" val="865148362"/>
+        <p14:creationId xmlns:p14="http://schemas.microsoft.com/office/powerpoint/2010/main" val="3844304542"/>
       </p:ext>
     </p:extLst>
   </p:cSld>

</xml_diff>